<commit_message>
Added a link to the github repo
</commit_message>
<xml_diff>
--- a/HavingYourCoffee/Having_Your_Coffee.pptx
+++ b/HavingYourCoffee/Having_Your_Coffee.pptx
@@ -4102,6 +4102,22 @@
             <a:r>
               <a:rPr lang="en-US" sz="2400" dirty="0" smtClean="0"/>
               <a:t> </a:t>
+            </a:r>
+            <a:endParaRPr lang="en-US" sz="2400" dirty="0" smtClean="0"/>
+          </a:p>
+          <a:p>
+            <a:pPr marL="0" indent="0" algn="ctr">
+              <a:buNone/>
+            </a:pPr>
+            <a:r>
+              <a:rPr lang="en-US" sz="2400" smtClean="0"/>
+              <a:t>Slides &amp; Code: </a:t>
+            </a:r>
+            <a:r>
+              <a:rPr lang="en-US" sz="2400" smtClean="0">
+                <a:hlinkClick r:id="rId6"/>
+              </a:rPr>
+              <a:t>https://github.com/jerrelblankenship/Presentations/</a:t>
             </a:r>
             <a:endParaRPr lang="en-US" sz="2400" dirty="0"/>
           </a:p>

</xml_diff>